<commit_message>
Update Metronome Academic Poster.pptx
</commit_message>
<xml_diff>
--- a/Metronome Academic Poster.pptx
+++ b/Metronome Academic Poster.pptx
@@ -243,7 +243,7 @@
           <a:p>
             <a:fld id="{2D635A45-521D-417D-8ECA-EEA43A32DB7F}" type="datetimeFigureOut">
               <a:rPr lang="en-IE" smtClean="0"/>
-              <a:t>15/05/2020</a:t>
+              <a:t>16/05/2020</a:t>
             </a:fld>
             <a:endParaRPr lang="en-IE"/>
           </a:p>
@@ -413,7 +413,7 @@
           <a:p>
             <a:fld id="{2D635A45-521D-417D-8ECA-EEA43A32DB7F}" type="datetimeFigureOut">
               <a:rPr lang="en-IE" smtClean="0"/>
-              <a:t>15/05/2020</a:t>
+              <a:t>16/05/2020</a:t>
             </a:fld>
             <a:endParaRPr lang="en-IE"/>
           </a:p>
@@ -593,7 +593,7 @@
           <a:p>
             <a:fld id="{2D635A45-521D-417D-8ECA-EEA43A32DB7F}" type="datetimeFigureOut">
               <a:rPr lang="en-IE" smtClean="0"/>
-              <a:t>15/05/2020</a:t>
+              <a:t>16/05/2020</a:t>
             </a:fld>
             <a:endParaRPr lang="en-IE"/>
           </a:p>
@@ -763,7 +763,7 @@
           <a:p>
             <a:fld id="{2D635A45-521D-417D-8ECA-EEA43A32DB7F}" type="datetimeFigureOut">
               <a:rPr lang="en-IE" smtClean="0"/>
-              <a:t>15/05/2020</a:t>
+              <a:t>16/05/2020</a:t>
             </a:fld>
             <a:endParaRPr lang="en-IE"/>
           </a:p>
@@ -1007,7 +1007,7 @@
           <a:p>
             <a:fld id="{2D635A45-521D-417D-8ECA-EEA43A32DB7F}" type="datetimeFigureOut">
               <a:rPr lang="en-IE" smtClean="0"/>
-              <a:t>15/05/2020</a:t>
+              <a:t>16/05/2020</a:t>
             </a:fld>
             <a:endParaRPr lang="en-IE"/>
           </a:p>
@@ -1239,7 +1239,7 @@
           <a:p>
             <a:fld id="{2D635A45-521D-417D-8ECA-EEA43A32DB7F}" type="datetimeFigureOut">
               <a:rPr lang="en-IE" smtClean="0"/>
-              <a:t>15/05/2020</a:t>
+              <a:t>16/05/2020</a:t>
             </a:fld>
             <a:endParaRPr lang="en-IE"/>
           </a:p>
@@ -1606,7 +1606,7 @@
           <a:p>
             <a:fld id="{2D635A45-521D-417D-8ECA-EEA43A32DB7F}" type="datetimeFigureOut">
               <a:rPr lang="en-IE" smtClean="0"/>
-              <a:t>15/05/2020</a:t>
+              <a:t>16/05/2020</a:t>
             </a:fld>
             <a:endParaRPr lang="en-IE"/>
           </a:p>
@@ -1724,7 +1724,7 @@
           <a:p>
             <a:fld id="{2D635A45-521D-417D-8ECA-EEA43A32DB7F}" type="datetimeFigureOut">
               <a:rPr lang="en-IE" smtClean="0"/>
-              <a:t>15/05/2020</a:t>
+              <a:t>16/05/2020</a:t>
             </a:fld>
             <a:endParaRPr lang="en-IE"/>
           </a:p>
@@ -1819,7 +1819,7 @@
           <a:p>
             <a:fld id="{2D635A45-521D-417D-8ECA-EEA43A32DB7F}" type="datetimeFigureOut">
               <a:rPr lang="en-IE" smtClean="0"/>
-              <a:t>15/05/2020</a:t>
+              <a:t>16/05/2020</a:t>
             </a:fld>
             <a:endParaRPr lang="en-IE"/>
           </a:p>
@@ -2096,7 +2096,7 @@
           <a:p>
             <a:fld id="{2D635A45-521D-417D-8ECA-EEA43A32DB7F}" type="datetimeFigureOut">
               <a:rPr lang="en-IE" smtClean="0"/>
-              <a:t>15/05/2020</a:t>
+              <a:t>16/05/2020</a:t>
             </a:fld>
             <a:endParaRPr lang="en-IE"/>
           </a:p>
@@ -2353,7 +2353,7 @@
           <a:p>
             <a:fld id="{2D635A45-521D-417D-8ECA-EEA43A32DB7F}" type="datetimeFigureOut">
               <a:rPr lang="en-IE" smtClean="0"/>
-              <a:t>15/05/2020</a:t>
+              <a:t>16/05/2020</a:t>
             </a:fld>
             <a:endParaRPr lang="en-IE"/>
           </a:p>
@@ -2566,7 +2566,7 @@
           <a:p>
             <a:fld id="{2D635A45-521D-417D-8ECA-EEA43A32DB7F}" type="datetimeFigureOut">
               <a:rPr lang="en-IE" smtClean="0"/>
-              <a:t>15/05/2020</a:t>
+              <a:t>16/05/2020</a:t>
             </a:fld>
             <a:endParaRPr lang="en-IE"/>
           </a:p>
@@ -3515,389 +3515,6 @@
       </p:grpSp>
       <p:grpSp>
         <p:nvGrpSpPr>
-          <p:cNvPr id="48" name="Group 47">
-            <a:extLst>
-              <a:ext uri="{FF2B5EF4-FFF2-40B4-BE49-F238E27FC236}">
-                <a16:creationId xmlns:a16="http://schemas.microsoft.com/office/drawing/2014/main" id="{25722E09-4B6C-47BA-B82A-6E1192CC52F5}"/>
-              </a:ext>
-            </a:extLst>
-          </p:cNvPr>
-          <p:cNvGrpSpPr/>
-          <p:nvPr/>
-        </p:nvGrpSpPr>
-        <p:grpSpPr>
-          <a:xfrm>
-            <a:off x="7801626" y="5035765"/>
-            <a:ext cx="12440429" cy="16151504"/>
-            <a:chOff x="8404922" y="2789792"/>
-            <a:chExt cx="12440429" cy="16151504"/>
-          </a:xfrm>
-        </p:grpSpPr>
-        <p:grpSp>
-          <p:nvGrpSpPr>
-            <p:cNvPr id="42" name="Group 41">
-              <a:extLst>
-                <a:ext uri="{FF2B5EF4-FFF2-40B4-BE49-F238E27FC236}">
-                  <a16:creationId xmlns:a16="http://schemas.microsoft.com/office/drawing/2014/main" id="{DEFC968D-E0CA-47F7-8F7E-9E23EE540DFD}"/>
-                </a:ext>
-              </a:extLst>
-            </p:cNvPr>
-            <p:cNvGrpSpPr/>
-            <p:nvPr/>
-          </p:nvGrpSpPr>
-          <p:grpSpPr>
-            <a:xfrm>
-              <a:off x="8404922" y="2789792"/>
-              <a:ext cx="8104609" cy="11059606"/>
-              <a:chOff x="8404922" y="2789792"/>
-              <a:chExt cx="8104609" cy="11059606"/>
-            </a:xfrm>
-          </p:grpSpPr>
-          <p:sp>
-            <p:nvSpPr>
-              <p:cNvPr id="9" name="TextBox 8">
-                <a:extLst>
-                  <a:ext uri="{FF2B5EF4-FFF2-40B4-BE49-F238E27FC236}">
-                    <a16:creationId xmlns:a16="http://schemas.microsoft.com/office/drawing/2014/main" id="{4C592057-2DE8-4E56-B38D-1E77DE7DC228}"/>
-                  </a:ext>
-                </a:extLst>
-              </p:cNvPr>
-              <p:cNvSpPr txBox="1"/>
-              <p:nvPr/>
-            </p:nvSpPr>
-            <p:spPr>
-              <a:xfrm>
-                <a:off x="8404923" y="2789792"/>
-                <a:ext cx="6696637" cy="1200329"/>
-              </a:xfrm>
-              <a:prstGeom prst="rect">
-                <a:avLst/>
-              </a:prstGeom>
-              <a:solidFill>
-                <a:srgbClr val="52D270"/>
-              </a:solidFill>
-            </p:spPr>
-            <p:txBody>
-              <a:bodyPr wrap="square" rtlCol="0">
-                <a:spAutoFit/>
-              </a:bodyPr>
-              <a:lstStyle/>
-              <a:p>
-                <a:r>
-                  <a:rPr lang="en-IE" sz="3600" b="1" dirty="0">
-                    <a:solidFill>
-                      <a:schemeClr val="bg1"/>
-                    </a:solidFill>
-                  </a:rPr>
-                  <a:t>3) Building the Machine</a:t>
-                </a:r>
-              </a:p>
-              <a:p>
-                <a:endParaRPr lang="en-IE" sz="3600" b="1" dirty="0">
-                  <a:solidFill>
-                    <a:schemeClr val="bg1"/>
-                  </a:solidFill>
-                </a:endParaRPr>
-              </a:p>
-            </p:txBody>
-          </p:sp>
-          <p:sp>
-            <p:nvSpPr>
-              <p:cNvPr id="11" name="TextBox 10">
-                <a:extLst>
-                  <a:ext uri="{FF2B5EF4-FFF2-40B4-BE49-F238E27FC236}">
-                    <a16:creationId xmlns:a16="http://schemas.microsoft.com/office/drawing/2014/main" id="{6B438F78-2821-42E5-B583-8A3095A3D4FB}"/>
-                  </a:ext>
-                </a:extLst>
-              </p:cNvPr>
-              <p:cNvSpPr txBox="1"/>
-              <p:nvPr/>
-            </p:nvSpPr>
-            <p:spPr>
-              <a:xfrm>
-                <a:off x="8404922" y="3954266"/>
-                <a:ext cx="6696637" cy="4893647"/>
-              </a:xfrm>
-              <a:prstGeom prst="rect">
-                <a:avLst/>
-              </a:prstGeom>
-              <a:solidFill>
-                <a:schemeClr val="bg1"/>
-              </a:solidFill>
-            </p:spPr>
-            <p:txBody>
-              <a:bodyPr wrap="square" rtlCol="0">
-                <a:spAutoFit/>
-              </a:bodyPr>
-              <a:lstStyle/>
-              <a:p>
-                <a:r>
-                  <a:rPr lang="en-IE" sz="2400" dirty="0"/>
-                  <a:t>For this section of the problem, we used an analogue input microphone to port A0 to record the sounds from the user, and set a </a:t>
-                </a:r>
-                <a:r>
-                  <a:rPr lang="en-IE" sz="2400" dirty="0" err="1"/>
-                  <a:t>const</a:t>
-                </a:r>
-                <a:r>
-                  <a:rPr lang="en-IE" sz="2400" dirty="0"/>
-                  <a:t> int THRESHOLD of 150 to use as a minimum value in order to avoid picking up unrelated audio.</a:t>
-                </a:r>
-              </a:p>
-              <a:p>
-                <a:endParaRPr lang="en-IE" sz="2400" dirty="0"/>
-              </a:p>
-              <a:p>
-                <a:r>
-                  <a:rPr lang="en-IE" sz="2400" dirty="0"/>
-                  <a:t>To see the fruits of our labour, we added a digital output LED in port 7 to flash twice before the Electronic Metronome was ready to record, and to flash once for 2 milliseconds between each interval.</a:t>
-                </a:r>
-              </a:p>
-              <a:p>
-                <a:endParaRPr lang="en-IE" sz="2400" dirty="0"/>
-              </a:p>
-              <a:p>
-                <a:r>
-                  <a:rPr lang="en-IE" sz="2400" dirty="0"/>
-                  <a:t>We then made the following function to calculate the BPM:</a:t>
-                </a:r>
-              </a:p>
-            </p:txBody>
-          </p:sp>
-          <p:sp>
-            <p:nvSpPr>
-              <p:cNvPr id="12" name="TextBox 11">
-                <a:extLst>
-                  <a:ext uri="{FF2B5EF4-FFF2-40B4-BE49-F238E27FC236}">
-                    <a16:creationId xmlns:a16="http://schemas.microsoft.com/office/drawing/2014/main" id="{BC52E79F-728D-4265-97DB-56A7D8D515F0}"/>
-                  </a:ext>
-                </a:extLst>
-              </p:cNvPr>
-              <p:cNvSpPr txBox="1"/>
-              <p:nvPr/>
-            </p:nvSpPr>
-            <p:spPr>
-              <a:xfrm>
-                <a:off x="8439486" y="3436123"/>
-                <a:ext cx="6662073" cy="523220"/>
-              </a:xfrm>
-              <a:prstGeom prst="rect">
-                <a:avLst/>
-              </a:prstGeom>
-              <a:solidFill>
-                <a:srgbClr val="52D270">
-                  <a:alpha val="49804"/>
-                </a:srgbClr>
-              </a:solidFill>
-            </p:spPr>
-            <p:txBody>
-              <a:bodyPr wrap="square" rtlCol="0">
-                <a:spAutoFit/>
-              </a:bodyPr>
-              <a:lstStyle/>
-              <a:p>
-                <a:r>
-                  <a:rPr lang="en-IE" sz="2800" b="1" dirty="0"/>
-                  <a:t>        a) Recording and Displaying Tempo</a:t>
-                </a:r>
-              </a:p>
-            </p:txBody>
-          </p:sp>
-          <p:pic>
-            <p:nvPicPr>
-              <p:cNvPr id="14" name="Picture 13">
-                <a:extLst>
-                  <a:ext uri="{FF2B5EF4-FFF2-40B4-BE49-F238E27FC236}">
-                    <a16:creationId xmlns:a16="http://schemas.microsoft.com/office/drawing/2014/main" id="{2DCC6C6C-AE81-44CC-A30C-076437939F97}"/>
-                  </a:ext>
-                </a:extLst>
-              </p:cNvPr>
-              <p:cNvPicPr>
-                <a:picLocks noChangeAspect="1"/>
-              </p:cNvPicPr>
-              <p:nvPr/>
-            </p:nvPicPr>
-            <p:blipFill>
-              <a:blip r:embed="rId4">
-                <a:extLst>
-                  <a:ext uri="{28A0092B-C50C-407E-A947-70E740481C1C}">
-                    <a14:useLocalDpi xmlns:a14="http://schemas.microsoft.com/office/drawing/2010/main" val="0"/>
-                  </a:ext>
-                </a:extLst>
-              </a:blip>
-              <a:stretch>
-                <a:fillRect/>
-              </a:stretch>
-            </p:blipFill>
-            <p:spPr>
-              <a:xfrm>
-                <a:off x="9748741" y="8474153"/>
-                <a:ext cx="6760790" cy="5375245"/>
-              </a:xfrm>
-              <a:prstGeom prst="rect">
-                <a:avLst/>
-              </a:prstGeom>
-            </p:spPr>
-          </p:pic>
-        </p:grpSp>
-        <p:grpSp>
-          <p:nvGrpSpPr>
-            <p:cNvPr id="39" name="Group 38">
-              <a:extLst>
-                <a:ext uri="{FF2B5EF4-FFF2-40B4-BE49-F238E27FC236}">
-                  <a16:creationId xmlns:a16="http://schemas.microsoft.com/office/drawing/2014/main" id="{530BEFA3-D165-436E-B9B4-D49EDC162720}"/>
-                </a:ext>
-              </a:extLst>
-            </p:cNvPr>
-            <p:cNvGrpSpPr/>
-            <p:nvPr/>
-          </p:nvGrpSpPr>
-          <p:grpSpPr>
-            <a:xfrm>
-              <a:off x="8404922" y="13849398"/>
-              <a:ext cx="12440429" cy="5091898"/>
-              <a:chOff x="8404922" y="14069185"/>
-              <a:chExt cx="12440429" cy="5091898"/>
-            </a:xfrm>
-          </p:grpSpPr>
-          <p:sp>
-            <p:nvSpPr>
-              <p:cNvPr id="17" name="TextBox 16">
-                <a:extLst>
-                  <a:ext uri="{FF2B5EF4-FFF2-40B4-BE49-F238E27FC236}">
-                    <a16:creationId xmlns:a16="http://schemas.microsoft.com/office/drawing/2014/main" id="{B7BFBA8C-82F3-493B-9524-C9247C50B0A3}"/>
-                  </a:ext>
-                </a:extLst>
-              </p:cNvPr>
-              <p:cNvSpPr txBox="1"/>
-              <p:nvPr/>
-            </p:nvSpPr>
-            <p:spPr>
-              <a:xfrm>
-                <a:off x="8404922" y="14592405"/>
-                <a:ext cx="6696637" cy="2677656"/>
-              </a:xfrm>
-              <a:prstGeom prst="rect">
-                <a:avLst/>
-              </a:prstGeom>
-              <a:solidFill>
-                <a:schemeClr val="bg1"/>
-              </a:solidFill>
-            </p:spPr>
-            <p:txBody>
-              <a:bodyPr wrap="square" rtlCol="0">
-                <a:spAutoFit/>
-              </a:bodyPr>
-              <a:lstStyle/>
-              <a:p>
-                <a:r>
-                  <a:rPr lang="en-IE" sz="2400" dirty="0"/>
-                  <a:t>With the use of </a:t>
-                </a:r>
-                <a:r>
-                  <a:rPr lang="en-IE" sz="2400" dirty="0" err="1"/>
-                  <a:t>PushingBox</a:t>
-                </a:r>
-                <a:r>
-                  <a:rPr lang="en-IE" sz="2400" dirty="0"/>
-                  <a:t>, </a:t>
-                </a:r>
-                <a:r>
-                  <a:rPr lang="en-IE" sz="2400" dirty="0" err="1"/>
-                  <a:t>GoogleSheets</a:t>
-                </a:r>
-                <a:r>
-                  <a:rPr lang="en-IE" sz="2400" dirty="0"/>
-                  <a:t> and Google Developer,  we were able to add a second digital input switch to let the program know if the user wanted to re-use the last recorded tempo, instead of clapping to create a beat.  When pushed, the switch moved the program to a second function called </a:t>
-                </a:r>
-                <a:r>
-                  <a:rPr lang="en-IE" sz="2400" dirty="0" err="1"/>
-                  <a:t>GetLastBeat</a:t>
-                </a:r>
-                <a:r>
-                  <a:rPr lang="en-IE" sz="2400" dirty="0"/>
-                  <a:t>() as seen here: </a:t>
-                </a:r>
-              </a:p>
-            </p:txBody>
-          </p:sp>
-          <p:sp>
-            <p:nvSpPr>
-              <p:cNvPr id="19" name="TextBox 18">
-                <a:extLst>
-                  <a:ext uri="{FF2B5EF4-FFF2-40B4-BE49-F238E27FC236}">
-                    <a16:creationId xmlns:a16="http://schemas.microsoft.com/office/drawing/2014/main" id="{F2ED209F-1C85-42DA-BF99-EAD03DF191F5}"/>
-                  </a:ext>
-                </a:extLst>
-              </p:cNvPr>
-              <p:cNvSpPr txBox="1"/>
-              <p:nvPr/>
-            </p:nvSpPr>
-            <p:spPr>
-              <a:xfrm>
-                <a:off x="8404922" y="14069185"/>
-                <a:ext cx="6696637" cy="523220"/>
-              </a:xfrm>
-              <a:prstGeom prst="rect">
-                <a:avLst/>
-              </a:prstGeom>
-              <a:solidFill>
-                <a:srgbClr val="52D270"/>
-              </a:solidFill>
-            </p:spPr>
-            <p:txBody>
-              <a:bodyPr wrap="square" rtlCol="0">
-                <a:spAutoFit/>
-              </a:bodyPr>
-              <a:lstStyle/>
-              <a:p>
-                <a:r>
-                  <a:rPr lang="en-IE" sz="2800" b="1" dirty="0"/>
-                  <a:t>          b) Sending and Receiving Data</a:t>
-                </a:r>
-              </a:p>
-            </p:txBody>
-          </p:sp>
-          <p:pic>
-            <p:nvPicPr>
-              <p:cNvPr id="21" name="Picture 20">
-                <a:extLst>
-                  <a:ext uri="{FF2B5EF4-FFF2-40B4-BE49-F238E27FC236}">
-                    <a16:creationId xmlns:a16="http://schemas.microsoft.com/office/drawing/2014/main" id="{CD708C09-BBF0-4530-AB56-5FDC49AD46FF}"/>
-                  </a:ext>
-                </a:extLst>
-              </p:cNvPr>
-              <p:cNvPicPr>
-                <a:picLocks noChangeAspect="1"/>
-              </p:cNvPicPr>
-              <p:nvPr/>
-            </p:nvPicPr>
-            <p:blipFill>
-              <a:blip r:embed="rId5">
-                <a:extLst>
-                  <a:ext uri="{28A0092B-C50C-407E-A947-70E740481C1C}">
-                    <a14:useLocalDpi xmlns:a14="http://schemas.microsoft.com/office/drawing/2010/main" val="0"/>
-                  </a:ext>
-                </a:extLst>
-              </a:blip>
-              <a:stretch>
-                <a:fillRect/>
-              </a:stretch>
-            </p:blipFill>
-            <p:spPr>
-              <a:xfrm>
-                <a:off x="8404922" y="17270061"/>
-                <a:ext cx="12440429" cy="1891022"/>
-              </a:xfrm>
-              <a:prstGeom prst="rect">
-                <a:avLst/>
-              </a:prstGeom>
-            </p:spPr>
-          </p:pic>
-        </p:grpSp>
-      </p:grpSp>
-      <p:grpSp>
-        <p:nvGrpSpPr>
           <p:cNvPr id="40" name="Group 39">
             <a:extLst>
               <a:ext uri="{FF2B5EF4-FFF2-40B4-BE49-F238E27FC236}">
@@ -4173,10 +3790,10 @@
         </p:nvGrpSpPr>
         <p:grpSpPr>
           <a:xfrm>
-            <a:off x="21856601" y="15928877"/>
-            <a:ext cx="8043398" cy="5111629"/>
-            <a:chOff x="21461506" y="1802369"/>
-            <a:chExt cx="8043398" cy="5111629"/>
+            <a:off x="21856601" y="15962191"/>
+            <a:ext cx="8043398" cy="5078315"/>
+            <a:chOff x="21461506" y="1835683"/>
+            <a:chExt cx="8043398" cy="5078315"/>
           </a:xfrm>
         </p:grpSpPr>
         <p:sp>
@@ -4193,7 +3810,7 @@
           </p:nvSpPr>
           <p:spPr>
             <a:xfrm>
-              <a:off x="21461506" y="1802369"/>
+              <a:off x="21461506" y="1835683"/>
               <a:ext cx="8043398" cy="553998"/>
             </a:xfrm>
             <a:prstGeom prst="rect">
@@ -4305,7 +3922,7 @@
               </a:r>
               <a:r>
                 <a:rPr lang="en-IE" sz="2400" dirty="0">
-                  <a:hlinkClick r:id="rId6"/>
+                  <a:hlinkClick r:id="rId4"/>
                 </a:rPr>
                 <a:t>https://trello.com/b/inEctDv3/iot-project</a:t>
               </a:r>
@@ -4324,7 +3941,7 @@
               </a:r>
               <a:r>
                 <a:rPr lang="en-IE" sz="2400" dirty="0">
-                  <a:hlinkClick r:id="rId7"/>
+                  <a:hlinkClick r:id="rId5"/>
                 </a:rPr>
                 <a:t>https://github.com/AbigailHerron/MetronomeProject</a:t>
               </a:r>
@@ -4347,7 +3964,7 @@
               </a:r>
               <a:r>
                 <a:rPr lang="en-IE" sz="2400" dirty="0">
-                  <a:hlinkClick r:id="rId8"/>
+                  <a:hlinkClick r:id="rId6"/>
                 </a:rPr>
                 <a:t>https://docs.google.com/spreadsheets/d/1HVSxekao9DAXwtTgJMPxqG1Bi8GDmG-GuQAPQ4u0X_E/edit#gid=0</a:t>
               </a:r>
@@ -4394,7 +4011,7 @@
             <p:nvPr/>
           </p:nvPicPr>
           <p:blipFill rotWithShape="1">
-            <a:blip r:embed="rId9">
+            <a:blip r:embed="rId7">
               <a:extLst>
                 <a:ext uri="{28A0092B-C50C-407E-A947-70E740481C1C}">
                   <a14:useLocalDpi xmlns:a14="http://schemas.microsoft.com/office/drawing/2010/main" val="0"/>
@@ -4479,7 +4096,7 @@
                   <a:solidFill>
                     <a:schemeClr val="bg1"/>
                   </a:solidFill>
-                  <a:hlinkClick r:id="rId10"/>
+                  <a:hlinkClick r:id="rId8"/>
                 </a:rPr>
                 <a:t>https://commons.wikimedia.org/wiki/File:ArduinoYunFront_2.jpg</a:t>
               </a:r>
@@ -4682,6 +4299,410 @@
           </a:fontRef>
         </p:style>
       </p:cxnSp>
+      <p:grpSp>
+        <p:nvGrpSpPr>
+          <p:cNvPr id="10" name="Group 9">
+            <a:extLst>
+              <a:ext uri="{FF2B5EF4-FFF2-40B4-BE49-F238E27FC236}">
+                <a16:creationId xmlns:a16="http://schemas.microsoft.com/office/drawing/2014/main" id="{74E7F939-E4A8-4FBE-A83C-BBF3DDB82499}"/>
+              </a:ext>
+            </a:extLst>
+          </p:cNvPr>
+          <p:cNvGrpSpPr/>
+          <p:nvPr/>
+        </p:nvGrpSpPr>
+        <p:grpSpPr>
+          <a:xfrm>
+            <a:off x="7801621" y="5035765"/>
+            <a:ext cx="12460439" cy="16003800"/>
+            <a:chOff x="7801621" y="5035765"/>
+            <a:chExt cx="12460439" cy="16003800"/>
+          </a:xfrm>
+        </p:grpSpPr>
+        <p:grpSp>
+          <p:nvGrpSpPr>
+            <p:cNvPr id="48" name="Group 47">
+              <a:extLst>
+                <a:ext uri="{FF2B5EF4-FFF2-40B4-BE49-F238E27FC236}">
+                  <a16:creationId xmlns:a16="http://schemas.microsoft.com/office/drawing/2014/main" id="{25722E09-4B6C-47BA-B82A-6E1192CC52F5}"/>
+                </a:ext>
+              </a:extLst>
+            </p:cNvPr>
+            <p:cNvGrpSpPr/>
+            <p:nvPr/>
+          </p:nvGrpSpPr>
+          <p:grpSpPr>
+            <a:xfrm>
+              <a:off x="7801626" y="5035765"/>
+              <a:ext cx="8104609" cy="14260482"/>
+              <a:chOff x="8404922" y="2789792"/>
+              <a:chExt cx="8104609" cy="14260482"/>
+            </a:xfrm>
+          </p:grpSpPr>
+          <p:grpSp>
+            <p:nvGrpSpPr>
+              <p:cNvPr id="42" name="Group 41">
+                <a:extLst>
+                  <a:ext uri="{FF2B5EF4-FFF2-40B4-BE49-F238E27FC236}">
+                    <a16:creationId xmlns:a16="http://schemas.microsoft.com/office/drawing/2014/main" id="{DEFC968D-E0CA-47F7-8F7E-9E23EE540DFD}"/>
+                  </a:ext>
+                </a:extLst>
+              </p:cNvPr>
+              <p:cNvGrpSpPr/>
+              <p:nvPr/>
+            </p:nvGrpSpPr>
+            <p:grpSpPr>
+              <a:xfrm>
+                <a:off x="8404922" y="2789792"/>
+                <a:ext cx="8104609" cy="11059606"/>
+                <a:chOff x="8404922" y="2789792"/>
+                <a:chExt cx="8104609" cy="11059606"/>
+              </a:xfrm>
+            </p:grpSpPr>
+            <p:sp>
+              <p:nvSpPr>
+                <p:cNvPr id="9" name="TextBox 8">
+                  <a:extLst>
+                    <a:ext uri="{FF2B5EF4-FFF2-40B4-BE49-F238E27FC236}">
+                      <a16:creationId xmlns:a16="http://schemas.microsoft.com/office/drawing/2014/main" id="{4C592057-2DE8-4E56-B38D-1E77DE7DC228}"/>
+                    </a:ext>
+                  </a:extLst>
+                </p:cNvPr>
+                <p:cNvSpPr txBox="1"/>
+                <p:nvPr/>
+              </p:nvSpPr>
+              <p:spPr>
+                <a:xfrm>
+                  <a:off x="8404923" y="2789792"/>
+                  <a:ext cx="6696637" cy="1200329"/>
+                </a:xfrm>
+                <a:prstGeom prst="rect">
+                  <a:avLst/>
+                </a:prstGeom>
+                <a:solidFill>
+                  <a:srgbClr val="52D270"/>
+                </a:solidFill>
+              </p:spPr>
+              <p:txBody>
+                <a:bodyPr wrap="square" rtlCol="0">
+                  <a:spAutoFit/>
+                </a:bodyPr>
+                <a:lstStyle/>
+                <a:p>
+                  <a:r>
+                    <a:rPr lang="en-IE" sz="3600" b="1" dirty="0">
+                      <a:solidFill>
+                        <a:schemeClr val="bg1"/>
+                      </a:solidFill>
+                    </a:rPr>
+                    <a:t>3) Building the Machine</a:t>
+                  </a:r>
+                </a:p>
+                <a:p>
+                  <a:endParaRPr lang="en-IE" sz="3600" b="1" dirty="0">
+                    <a:solidFill>
+                      <a:schemeClr val="bg1"/>
+                    </a:solidFill>
+                  </a:endParaRPr>
+                </a:p>
+              </p:txBody>
+            </p:sp>
+            <p:sp>
+              <p:nvSpPr>
+                <p:cNvPr id="11" name="TextBox 10">
+                  <a:extLst>
+                    <a:ext uri="{FF2B5EF4-FFF2-40B4-BE49-F238E27FC236}">
+                      <a16:creationId xmlns:a16="http://schemas.microsoft.com/office/drawing/2014/main" id="{6B438F78-2821-42E5-B583-8A3095A3D4FB}"/>
+                    </a:ext>
+                  </a:extLst>
+                </p:cNvPr>
+                <p:cNvSpPr txBox="1"/>
+                <p:nvPr/>
+              </p:nvSpPr>
+              <p:spPr>
+                <a:xfrm>
+                  <a:off x="8404922" y="3954266"/>
+                  <a:ext cx="6696637" cy="4893647"/>
+                </a:xfrm>
+                <a:prstGeom prst="rect">
+                  <a:avLst/>
+                </a:prstGeom>
+                <a:solidFill>
+                  <a:schemeClr val="bg1"/>
+                </a:solidFill>
+              </p:spPr>
+              <p:txBody>
+                <a:bodyPr wrap="square" rtlCol="0">
+                  <a:spAutoFit/>
+                </a:bodyPr>
+                <a:lstStyle/>
+                <a:p>
+                  <a:r>
+                    <a:rPr lang="en-IE" sz="2400" dirty="0"/>
+                    <a:t>For this section of the problem, we used an analogue input microphone to port A0 to record the sounds from the user, and set a </a:t>
+                  </a:r>
+                  <a:r>
+                    <a:rPr lang="en-IE" sz="2400" dirty="0" err="1"/>
+                    <a:t>const</a:t>
+                  </a:r>
+                  <a:r>
+                    <a:rPr lang="en-IE" sz="2400" dirty="0"/>
+                    <a:t> int THRESHOLD of 150 to use as a minimum value in order to avoid picking up unrelated audio.</a:t>
+                  </a:r>
+                </a:p>
+                <a:p>
+                  <a:endParaRPr lang="en-IE" sz="2400" dirty="0"/>
+                </a:p>
+                <a:p>
+                  <a:r>
+                    <a:rPr lang="en-IE" sz="2400" dirty="0"/>
+                    <a:t>To see the fruits of our labour, we added a digital output LED in port 7 to flash twice before the Electronic Metronome was ready to record, and to flash once for 2 milliseconds between each interval.</a:t>
+                  </a:r>
+                </a:p>
+                <a:p>
+                  <a:endParaRPr lang="en-IE" sz="2400" dirty="0"/>
+                </a:p>
+                <a:p>
+                  <a:r>
+                    <a:rPr lang="en-IE" sz="2400" dirty="0"/>
+                    <a:t>We then made the following function to calculate the BPM:</a:t>
+                  </a:r>
+                </a:p>
+              </p:txBody>
+            </p:sp>
+            <p:sp>
+              <p:nvSpPr>
+                <p:cNvPr id="12" name="TextBox 11">
+                  <a:extLst>
+                    <a:ext uri="{FF2B5EF4-FFF2-40B4-BE49-F238E27FC236}">
+                      <a16:creationId xmlns:a16="http://schemas.microsoft.com/office/drawing/2014/main" id="{BC52E79F-728D-4265-97DB-56A7D8D515F0}"/>
+                    </a:ext>
+                  </a:extLst>
+                </p:cNvPr>
+                <p:cNvSpPr txBox="1"/>
+                <p:nvPr/>
+              </p:nvSpPr>
+              <p:spPr>
+                <a:xfrm>
+                  <a:off x="8439486" y="3436123"/>
+                  <a:ext cx="6662073" cy="523220"/>
+                </a:xfrm>
+                <a:prstGeom prst="rect">
+                  <a:avLst/>
+                </a:prstGeom>
+                <a:solidFill>
+                  <a:srgbClr val="52D270">
+                    <a:alpha val="49804"/>
+                  </a:srgbClr>
+                </a:solidFill>
+              </p:spPr>
+              <p:txBody>
+                <a:bodyPr wrap="square" rtlCol="0">
+                  <a:spAutoFit/>
+                </a:bodyPr>
+                <a:lstStyle/>
+                <a:p>
+                  <a:r>
+                    <a:rPr lang="en-IE" sz="2800" b="1" dirty="0"/>
+                    <a:t>        a) Recording and Displaying Tempo</a:t>
+                  </a:r>
+                </a:p>
+              </p:txBody>
+            </p:sp>
+            <p:pic>
+              <p:nvPicPr>
+                <p:cNvPr id="14" name="Picture 13">
+                  <a:extLst>
+                    <a:ext uri="{FF2B5EF4-FFF2-40B4-BE49-F238E27FC236}">
+                      <a16:creationId xmlns:a16="http://schemas.microsoft.com/office/drawing/2014/main" id="{2DCC6C6C-AE81-44CC-A30C-076437939F97}"/>
+                    </a:ext>
+                  </a:extLst>
+                </p:cNvPr>
+                <p:cNvPicPr>
+                  <a:picLocks noChangeAspect="1"/>
+                </p:cNvPicPr>
+                <p:nvPr/>
+              </p:nvPicPr>
+              <p:blipFill>
+                <a:blip r:embed="rId9">
+                  <a:extLst>
+                    <a:ext uri="{28A0092B-C50C-407E-A947-70E740481C1C}">
+                      <a14:useLocalDpi xmlns:a14="http://schemas.microsoft.com/office/drawing/2010/main" val="0"/>
+                    </a:ext>
+                  </a:extLst>
+                </a:blip>
+                <a:stretch>
+                  <a:fillRect/>
+                </a:stretch>
+              </p:blipFill>
+              <p:spPr>
+                <a:xfrm>
+                  <a:off x="9748741" y="8474153"/>
+                  <a:ext cx="6760790" cy="5375245"/>
+                </a:xfrm>
+                <a:prstGeom prst="rect">
+                  <a:avLst/>
+                </a:prstGeom>
+              </p:spPr>
+            </p:pic>
+          </p:grpSp>
+          <p:grpSp>
+            <p:nvGrpSpPr>
+              <p:cNvPr id="39" name="Group 38">
+                <a:extLst>
+                  <a:ext uri="{FF2B5EF4-FFF2-40B4-BE49-F238E27FC236}">
+                    <a16:creationId xmlns:a16="http://schemas.microsoft.com/office/drawing/2014/main" id="{530BEFA3-D165-436E-B9B4-D49EDC162720}"/>
+                  </a:ext>
+                </a:extLst>
+              </p:cNvPr>
+              <p:cNvGrpSpPr/>
+              <p:nvPr/>
+            </p:nvGrpSpPr>
+            <p:grpSpPr>
+              <a:xfrm>
+                <a:off x="8404922" y="13849398"/>
+                <a:ext cx="6696637" cy="3200876"/>
+                <a:chOff x="8404922" y="14069185"/>
+                <a:chExt cx="6696637" cy="3200876"/>
+              </a:xfrm>
+            </p:grpSpPr>
+            <p:sp>
+              <p:nvSpPr>
+                <p:cNvPr id="17" name="TextBox 16">
+                  <a:extLst>
+                    <a:ext uri="{FF2B5EF4-FFF2-40B4-BE49-F238E27FC236}">
+                      <a16:creationId xmlns:a16="http://schemas.microsoft.com/office/drawing/2014/main" id="{B7BFBA8C-82F3-493B-9524-C9247C50B0A3}"/>
+                    </a:ext>
+                  </a:extLst>
+                </p:cNvPr>
+                <p:cNvSpPr txBox="1"/>
+                <p:nvPr/>
+              </p:nvSpPr>
+              <p:spPr>
+                <a:xfrm>
+                  <a:off x="8404922" y="14592405"/>
+                  <a:ext cx="6696637" cy="2677656"/>
+                </a:xfrm>
+                <a:prstGeom prst="rect">
+                  <a:avLst/>
+                </a:prstGeom>
+                <a:solidFill>
+                  <a:schemeClr val="bg1"/>
+                </a:solidFill>
+              </p:spPr>
+              <p:txBody>
+                <a:bodyPr wrap="square" rtlCol="0">
+                  <a:spAutoFit/>
+                </a:bodyPr>
+                <a:lstStyle/>
+                <a:p>
+                  <a:r>
+                    <a:rPr lang="en-IE" sz="2400" dirty="0"/>
+                    <a:t>With the use of </a:t>
+                  </a:r>
+                  <a:r>
+                    <a:rPr lang="en-IE" sz="2400" dirty="0" err="1"/>
+                    <a:t>PushingBox</a:t>
+                  </a:r>
+                  <a:r>
+                    <a:rPr lang="en-IE" sz="2400" dirty="0"/>
+                    <a:t>, </a:t>
+                  </a:r>
+                  <a:r>
+                    <a:rPr lang="en-IE" sz="2400" dirty="0" err="1"/>
+                    <a:t>GoogleSheets</a:t>
+                  </a:r>
+                  <a:r>
+                    <a:rPr lang="en-IE" sz="2400" dirty="0"/>
+                    <a:t> and Google Developer,  we were able to add a second digital input switch to let the program know if the user wanted to re-use the last recorded tempo, instead of clapping to create a beat.  When pushed, the switch moved the program to a second function called </a:t>
+                  </a:r>
+                  <a:r>
+                    <a:rPr lang="en-IE" sz="2400" dirty="0" err="1"/>
+                    <a:t>GetLastBeat</a:t>
+                  </a:r>
+                  <a:r>
+                    <a:rPr lang="en-IE" sz="2400" dirty="0"/>
+                    <a:t>() as seen here: </a:t>
+                  </a:r>
+                </a:p>
+              </p:txBody>
+            </p:sp>
+            <p:sp>
+              <p:nvSpPr>
+                <p:cNvPr id="19" name="TextBox 18">
+                  <a:extLst>
+                    <a:ext uri="{FF2B5EF4-FFF2-40B4-BE49-F238E27FC236}">
+                      <a16:creationId xmlns:a16="http://schemas.microsoft.com/office/drawing/2014/main" id="{F2ED209F-1C85-42DA-BF99-EAD03DF191F5}"/>
+                    </a:ext>
+                  </a:extLst>
+                </p:cNvPr>
+                <p:cNvSpPr txBox="1"/>
+                <p:nvPr/>
+              </p:nvSpPr>
+              <p:spPr>
+                <a:xfrm>
+                  <a:off x="8404922" y="14069185"/>
+                  <a:ext cx="6696637" cy="523220"/>
+                </a:xfrm>
+                <a:prstGeom prst="rect">
+                  <a:avLst/>
+                </a:prstGeom>
+                <a:solidFill>
+                  <a:srgbClr val="52D270"/>
+                </a:solidFill>
+              </p:spPr>
+              <p:txBody>
+                <a:bodyPr wrap="square" rtlCol="0">
+                  <a:spAutoFit/>
+                </a:bodyPr>
+                <a:lstStyle/>
+                <a:p>
+                  <a:r>
+                    <a:rPr lang="en-IE" sz="2800" b="1" dirty="0"/>
+                    <a:t>          b) Sending and Receiving Data</a:t>
+                  </a:r>
+                </a:p>
+              </p:txBody>
+            </p:sp>
+          </p:grpSp>
+        </p:grpSp>
+        <p:pic>
+          <p:nvPicPr>
+            <p:cNvPr id="7" name="Picture 6">
+              <a:extLst>
+                <a:ext uri="{FF2B5EF4-FFF2-40B4-BE49-F238E27FC236}">
+                  <a16:creationId xmlns:a16="http://schemas.microsoft.com/office/drawing/2014/main" id="{71F9CE7A-681E-4CA0-A277-452B0594FB42}"/>
+                </a:ext>
+              </a:extLst>
+            </p:cNvPr>
+            <p:cNvPicPr>
+              <a:picLocks noChangeAspect="1"/>
+            </p:cNvPicPr>
+            <p:nvPr/>
+          </p:nvPicPr>
+          <p:blipFill>
+            <a:blip r:embed="rId10">
+              <a:extLst>
+                <a:ext uri="{28A0092B-C50C-407E-A947-70E740481C1C}">
+                  <a14:useLocalDpi xmlns:a14="http://schemas.microsoft.com/office/drawing/2010/main" val="0"/>
+                </a:ext>
+              </a:extLst>
+            </a:blip>
+            <a:stretch>
+              <a:fillRect/>
+            </a:stretch>
+          </p:blipFill>
+          <p:spPr>
+            <a:xfrm>
+              <a:off x="7801621" y="19296247"/>
+              <a:ext cx="12460439" cy="1743318"/>
+            </a:xfrm>
+            <a:prstGeom prst="rect">
+              <a:avLst/>
+            </a:prstGeom>
+          </p:spPr>
+        </p:pic>
+      </p:grpSp>
     </p:spTree>
     <p:extLst>
       <p:ext uri="{BB962C8B-B14F-4D97-AF65-F5344CB8AC3E}">

</xml_diff>